<commit_message>
se modifico el arbol causa efecto
</commit_message>
<xml_diff>
--- a/tesis1/arbolCausaefecto.pptx
+++ b/tesis1/arbolCausaefecto.pptx
@@ -5,7 +5,9 @@
     <p:sldMasterId id="2147483648" r:id="rId1"/>
   </p:sldMasterIdLst>
   <p:sldIdLst>
-    <p:sldId id="256" r:id="rId2"/>
+    <p:sldId id="257" r:id="rId2"/>
+    <p:sldId id="256" r:id="rId3"/>
+    <p:sldId id="258" r:id="rId4"/>
   </p:sldIdLst>
   <p:sldSz cx="12192000" cy="6858000"/>
   <p:notesSz cx="6858000" cy="9144000"/>
@@ -104,6 +106,11 @@
       </a:defRPr>
     </a:lvl9pPr>
   </p:defaultTextStyle>
+  <p:extLst>
+    <p:ext uri="{EFAFB233-063F-42B5-8137-9DF3F51BA10A}">
+      <p15:sldGuideLst xmlns:p15="http://schemas.microsoft.com/office/powerpoint/2012/main"/>
+    </p:ext>
+  </p:extLst>
 </p:presentation>
 </file>
 
@@ -256,7 +263,7 @@
           <a:p>
             <a:fld id="{6CCEB60B-D84B-441B-B17D-C81DC4D5BE63}" type="datetimeFigureOut">
               <a:rPr lang="es-PE" smtClean="0"/>
-              <a:t>12/09/2018</a:t>
+              <a:t>04/10/2018</a:t>
             </a:fld>
             <a:endParaRPr lang="es-PE"/>
           </a:p>
@@ -456,7 +463,7 @@
           <a:p>
             <a:fld id="{6CCEB60B-D84B-441B-B17D-C81DC4D5BE63}" type="datetimeFigureOut">
               <a:rPr lang="es-PE" smtClean="0"/>
-              <a:t>12/09/2018</a:t>
+              <a:t>04/10/2018</a:t>
             </a:fld>
             <a:endParaRPr lang="es-PE"/>
           </a:p>
@@ -666,7 +673,7 @@
           <a:p>
             <a:fld id="{6CCEB60B-D84B-441B-B17D-C81DC4D5BE63}" type="datetimeFigureOut">
               <a:rPr lang="es-PE" smtClean="0"/>
-              <a:t>12/09/2018</a:t>
+              <a:t>04/10/2018</a:t>
             </a:fld>
             <a:endParaRPr lang="es-PE"/>
           </a:p>
@@ -866,7 +873,7 @@
           <a:p>
             <a:fld id="{6CCEB60B-D84B-441B-B17D-C81DC4D5BE63}" type="datetimeFigureOut">
               <a:rPr lang="es-PE" smtClean="0"/>
-              <a:t>12/09/2018</a:t>
+              <a:t>04/10/2018</a:t>
             </a:fld>
             <a:endParaRPr lang="es-PE"/>
           </a:p>
@@ -1142,7 +1149,7 @@
           <a:p>
             <a:fld id="{6CCEB60B-D84B-441B-B17D-C81DC4D5BE63}" type="datetimeFigureOut">
               <a:rPr lang="es-PE" smtClean="0"/>
-              <a:t>12/09/2018</a:t>
+              <a:t>04/10/2018</a:t>
             </a:fld>
             <a:endParaRPr lang="es-PE"/>
           </a:p>
@@ -1410,7 +1417,7 @@
           <a:p>
             <a:fld id="{6CCEB60B-D84B-441B-B17D-C81DC4D5BE63}" type="datetimeFigureOut">
               <a:rPr lang="es-PE" smtClean="0"/>
-              <a:t>12/09/2018</a:t>
+              <a:t>04/10/2018</a:t>
             </a:fld>
             <a:endParaRPr lang="es-PE"/>
           </a:p>
@@ -1825,7 +1832,7 @@
           <a:p>
             <a:fld id="{6CCEB60B-D84B-441B-B17D-C81DC4D5BE63}" type="datetimeFigureOut">
               <a:rPr lang="es-PE" smtClean="0"/>
-              <a:t>12/09/2018</a:t>
+              <a:t>04/10/2018</a:t>
             </a:fld>
             <a:endParaRPr lang="es-PE"/>
           </a:p>
@@ -1967,7 +1974,7 @@
           <a:p>
             <a:fld id="{6CCEB60B-D84B-441B-B17D-C81DC4D5BE63}" type="datetimeFigureOut">
               <a:rPr lang="es-PE" smtClean="0"/>
-              <a:t>12/09/2018</a:t>
+              <a:t>04/10/2018</a:t>
             </a:fld>
             <a:endParaRPr lang="es-PE"/>
           </a:p>
@@ -2080,7 +2087,7 @@
           <a:p>
             <a:fld id="{6CCEB60B-D84B-441B-B17D-C81DC4D5BE63}" type="datetimeFigureOut">
               <a:rPr lang="es-PE" smtClean="0"/>
-              <a:t>12/09/2018</a:t>
+              <a:t>04/10/2018</a:t>
             </a:fld>
             <a:endParaRPr lang="es-PE"/>
           </a:p>
@@ -2393,7 +2400,7 @@
           <a:p>
             <a:fld id="{6CCEB60B-D84B-441B-B17D-C81DC4D5BE63}" type="datetimeFigureOut">
               <a:rPr lang="es-PE" smtClean="0"/>
-              <a:t>12/09/2018</a:t>
+              <a:t>04/10/2018</a:t>
             </a:fld>
             <a:endParaRPr lang="es-PE"/>
           </a:p>
@@ -2682,7 +2689,7 @@
           <a:p>
             <a:fld id="{6CCEB60B-D84B-441B-B17D-C81DC4D5BE63}" type="datetimeFigureOut">
               <a:rPr lang="es-PE" smtClean="0"/>
-              <a:t>12/09/2018</a:t>
+              <a:t>04/10/2018</a:t>
             </a:fld>
             <a:endParaRPr lang="es-PE"/>
           </a:p>
@@ -2925,7 +2932,7 @@
           <a:p>
             <a:fld id="{6CCEB60B-D84B-441B-B17D-C81DC4D5BE63}" type="datetimeFigureOut">
               <a:rPr lang="es-PE" smtClean="0"/>
-              <a:t>12/09/2018</a:t>
+              <a:t>04/10/2018</a:t>
             </a:fld>
             <a:endParaRPr lang="es-PE"/>
           </a:p>
@@ -3344,10 +3351,96 @@
       </p:grpSpPr>
       <p:sp>
         <p:nvSpPr>
-          <p:cNvPr id="4" name="Rectángulo: esquinas redondeadas 3">
-            <a:extLst>
-              <a:ext uri="{FF2B5EF4-FFF2-40B4-BE49-F238E27FC236}">
-                <a16:creationId xmlns:a16="http://schemas.microsoft.com/office/drawing/2014/main" id="{C543DE93-F577-430D-8898-A1B056AC5366}"/>
+          <p:cNvPr id="2" name="Título 1">
+            <a:extLst>
+              <a:ext uri="{FF2B5EF4-FFF2-40B4-BE49-F238E27FC236}">
+                <a16:creationId xmlns:a16="http://schemas.microsoft.com/office/drawing/2014/main" id="{78E13FA2-C553-41AB-B4E3-D47FD7A7B287}"/>
+              </a:ext>
+            </a:extLst>
+          </p:cNvPr>
+          <p:cNvSpPr>
+            <a:spLocks noGrp="1"/>
+          </p:cNvSpPr>
+          <p:nvPr>
+            <p:ph type="title"/>
+          </p:nvPr>
+        </p:nvSpPr>
+        <p:spPr>
+          <a:xfrm>
+            <a:off x="6861547" y="2675002"/>
+            <a:ext cx="4813002" cy="1664052"/>
+          </a:xfrm>
+        </p:spPr>
+        <p:txBody>
+          <a:bodyPr>
+            <a:normAutofit/>
+          </a:bodyPr>
+          <a:lstStyle/>
+          <a:p>
+            <a:r>
+              <a:rPr lang="es-PE" sz="2800" dirty="0"/>
+              <a:t>Aplicativo móvil predictivo para encontrar una agencia de banco usando el algoritmo A*</a:t>
+            </a:r>
+          </a:p>
+        </p:txBody>
+      </p:sp>
+      <p:sp>
+        <p:nvSpPr>
+          <p:cNvPr id="4" name="Título 1">
+            <a:extLst>
+              <a:ext uri="{FF2B5EF4-FFF2-40B4-BE49-F238E27FC236}">
+                <a16:creationId xmlns:a16="http://schemas.microsoft.com/office/drawing/2014/main" id="{1775C6E5-83EE-46DD-8F21-78CBB6E9AACA}"/>
+              </a:ext>
+            </a:extLst>
+          </p:cNvPr>
+          <p:cNvSpPr txBox="1">
+            <a:spLocks/>
+          </p:cNvSpPr>
+          <p:nvPr/>
+        </p:nvSpPr>
+        <p:spPr>
+          <a:xfrm>
+            <a:off x="629093" y="1842976"/>
+            <a:ext cx="5275520" cy="3328104"/>
+          </a:xfrm>
+          <a:prstGeom prst="rect">
+            <a:avLst/>
+          </a:prstGeom>
+        </p:spPr>
+        <p:txBody>
+          <a:bodyPr vert="horz" lIns="91440" tIns="45720" rIns="91440" bIns="45720" rtlCol="0" anchor="ctr">
+            <a:normAutofit/>
+          </a:bodyPr>
+          <a:lstStyle>
+            <a:lvl1pPr algn="l" defTabSz="914400" rtl="0" eaLnBrk="1" latinLnBrk="0" hangingPunct="1">
+              <a:lnSpc>
+                <a:spcPct val="90000"/>
+              </a:lnSpc>
+              <a:spcBef>
+                <a:spcPct val="0"/>
+              </a:spcBef>
+              <a:buNone/>
+              <a:defRPr sz="4400" kern="1200">
+                <a:solidFill>
+                  <a:schemeClr val="tx1"/>
+                </a:solidFill>
+                <a:latin typeface="+mj-lt"/>
+                <a:ea typeface="+mj-ea"/>
+                <a:cs typeface="+mj-cs"/>
+              </a:defRPr>
+            </a:lvl1pPr>
+          </a:lstStyle>
+          <a:p>
+            <a:endParaRPr lang="es-PE" dirty="0"/>
+          </a:p>
+        </p:txBody>
+      </p:sp>
+      <p:sp>
+        <p:nvSpPr>
+          <p:cNvPr id="5" name="Rectángulo 4">
+            <a:extLst>
+              <a:ext uri="{FF2B5EF4-FFF2-40B4-BE49-F238E27FC236}">
+                <a16:creationId xmlns:a16="http://schemas.microsoft.com/office/drawing/2014/main" id="{33E8F1EF-983F-43A2-8787-21246D385D2C}"/>
               </a:ext>
             </a:extLst>
           </p:cNvPr>
@@ -3356,10 +3449,48 @@
         </p:nvSpPr>
         <p:spPr>
           <a:xfrm>
-            <a:off x="4320364" y="3551560"/>
-            <a:ext cx="3806456" cy="701748"/>
-          </a:xfrm>
-          <a:prstGeom prst="roundRect">
+            <a:off x="345558" y="2736502"/>
+            <a:ext cx="4853762" cy="1384995"/>
+          </a:xfrm>
+          <a:prstGeom prst="rect">
+            <a:avLst/>
+          </a:prstGeom>
+        </p:spPr>
+        <p:txBody>
+          <a:bodyPr wrap="square">
+            <a:spAutoFit/>
+          </a:bodyPr>
+          <a:lstStyle/>
+          <a:p>
+            <a:r>
+              <a:rPr lang="es-PE" sz="2800" dirty="0">
+                <a:latin typeface="+mj-lt"/>
+                <a:ea typeface="+mj-ea"/>
+                <a:cs typeface="+mj-cs"/>
+              </a:rPr>
+              <a:t>Sistema de distribución de clientes para agencias de banco mediante el algoritmo A*.</a:t>
+            </a:r>
+          </a:p>
+        </p:txBody>
+      </p:sp>
+      <p:sp>
+        <p:nvSpPr>
+          <p:cNvPr id="6" name="Flecha: a la derecha 5">
+            <a:extLst>
+              <a:ext uri="{FF2B5EF4-FFF2-40B4-BE49-F238E27FC236}">
+                <a16:creationId xmlns:a16="http://schemas.microsoft.com/office/drawing/2014/main" id="{9101F0EA-FB39-4836-9C40-A74BA0419CA0}"/>
+              </a:ext>
+            </a:extLst>
+          </p:cNvPr>
+          <p:cNvSpPr/>
+          <p:nvPr/>
+        </p:nvSpPr>
+        <p:spPr>
+          <a:xfrm>
+            <a:off x="5465135" y="3040910"/>
+            <a:ext cx="903767" cy="776177"/>
+          </a:xfrm>
+          <a:prstGeom prst="rightArrow">
             <a:avLst/>
           </a:prstGeom>
         </p:spPr>
@@ -3384,19 +3515,16 @@
           <a:lstStyle/>
           <a:p>
             <a:pPr algn="ctr"/>
-            <a:r>
-              <a:rPr lang="es-PE" sz="1200" dirty="0"/>
-              <a:t>EXCESIVO TIEMPO DE ESPERA QUE SUFREN LOS CLIENTES EN LAS AGENCIAS DEL BCP</a:t>
-            </a:r>
-          </a:p>
-        </p:txBody>
-      </p:sp>
-      <p:sp>
-        <p:nvSpPr>
-          <p:cNvPr id="5" name="CuadroTexto 4">
-            <a:extLst>
-              <a:ext uri="{FF2B5EF4-FFF2-40B4-BE49-F238E27FC236}">
-                <a16:creationId xmlns:a16="http://schemas.microsoft.com/office/drawing/2014/main" id="{B80F88E9-9197-4798-99A8-2CDD14DB5ADE}"/>
+            <a:endParaRPr lang="es-PE"/>
+          </a:p>
+        </p:txBody>
+      </p:sp>
+      <p:sp>
+        <p:nvSpPr>
+          <p:cNvPr id="8" name="CuadroTexto 7">
+            <a:extLst>
+              <a:ext uri="{FF2B5EF4-FFF2-40B4-BE49-F238E27FC236}">
+                <a16:creationId xmlns:a16="http://schemas.microsoft.com/office/drawing/2014/main" id="{E05ED82B-7796-417A-9B6F-B2A2E7BC2D5B}"/>
               </a:ext>
             </a:extLst>
           </p:cNvPr>
@@ -3405,8 +3533,8 @@
         </p:nvSpPr>
         <p:spPr>
           <a:xfrm>
-            <a:off x="1127048" y="3668245"/>
-            <a:ext cx="786497" cy="276999"/>
+            <a:off x="1584251" y="4731488"/>
+            <a:ext cx="1809854" cy="369332"/>
           </a:xfrm>
           <a:prstGeom prst="rect">
             <a:avLst/>
@@ -3420,18 +3548,83 @@
           <a:lstStyle/>
           <a:p>
             <a:r>
-              <a:rPr lang="es-PE" sz="1200" dirty="0"/>
-              <a:t>Problema</a:t>
-            </a:r>
-          </a:p>
-        </p:txBody>
-      </p:sp>
-      <p:sp>
-        <p:nvSpPr>
-          <p:cNvPr id="6" name="Rectángulo 5">
-            <a:extLst>
-              <a:ext uri="{FF2B5EF4-FFF2-40B4-BE49-F238E27FC236}">
-                <a16:creationId xmlns:a16="http://schemas.microsoft.com/office/drawing/2014/main" id="{5B8766BE-7CD9-4569-86D0-4F8F9B330582}"/>
+              <a:rPr lang="es-PE" dirty="0"/>
+              <a:t>TITULO ANTIGUO</a:t>
+            </a:r>
+          </a:p>
+        </p:txBody>
+      </p:sp>
+      <p:sp>
+        <p:nvSpPr>
+          <p:cNvPr id="9" name="CuadroTexto 8">
+            <a:extLst>
+              <a:ext uri="{FF2B5EF4-FFF2-40B4-BE49-F238E27FC236}">
+                <a16:creationId xmlns:a16="http://schemas.microsoft.com/office/drawing/2014/main" id="{50B9C425-61F2-4F24-ABA8-8A80ED9575F6}"/>
+              </a:ext>
+            </a:extLst>
+          </p:cNvPr>
+          <p:cNvSpPr txBox="1"/>
+          <p:nvPr/>
+        </p:nvSpPr>
+        <p:spPr>
+          <a:xfrm>
+            <a:off x="8275674" y="4731488"/>
+            <a:ext cx="1601657" cy="369332"/>
+          </a:xfrm>
+          <a:prstGeom prst="rect">
+            <a:avLst/>
+          </a:prstGeom>
+          <a:noFill/>
+        </p:spPr>
+        <p:txBody>
+          <a:bodyPr wrap="none" rtlCol="0">
+            <a:spAutoFit/>
+          </a:bodyPr>
+          <a:lstStyle/>
+          <a:p>
+            <a:r>
+              <a:rPr lang="es-PE" dirty="0"/>
+              <a:t>TITULO NUEVO</a:t>
+            </a:r>
+          </a:p>
+        </p:txBody>
+      </p:sp>
+    </p:spTree>
+    <p:extLst>
+      <p:ext uri="{BB962C8B-B14F-4D97-AF65-F5344CB8AC3E}">
+        <p14:creationId xmlns:p14="http://schemas.microsoft.com/office/powerpoint/2010/main" val="1003615797"/>
+      </p:ext>
+    </p:extLst>
+  </p:cSld>
+  <p:clrMapOvr>
+    <a:masterClrMapping/>
+  </p:clrMapOvr>
+</p:sld>
+</file>
+
+<file path=ppt/slides/slide2.xml><?xml version="1.0" encoding="utf-8"?>
+<p:sld xmlns:a="http://schemas.openxmlformats.org/drawingml/2006/main" xmlns:r="http://schemas.openxmlformats.org/officeDocument/2006/relationships" xmlns:p="http://schemas.openxmlformats.org/presentationml/2006/main">
+  <p:cSld>
+    <p:spTree>
+      <p:nvGrpSpPr>
+        <p:cNvPr id="1" name=""/>
+        <p:cNvGrpSpPr/>
+        <p:nvPr/>
+      </p:nvGrpSpPr>
+      <p:grpSpPr>
+        <a:xfrm>
+          <a:off x="0" y="0"/>
+          <a:ext cx="0" cy="0"/>
+          <a:chOff x="0" y="0"/>
+          <a:chExt cx="0" cy="0"/>
+        </a:xfrm>
+      </p:grpSpPr>
+      <p:sp>
+        <p:nvSpPr>
+          <p:cNvPr id="4" name="Rectángulo: esquinas redondeadas 3">
+            <a:extLst>
+              <a:ext uri="{FF2B5EF4-FFF2-40B4-BE49-F238E27FC236}">
+                <a16:creationId xmlns:a16="http://schemas.microsoft.com/office/drawing/2014/main" id="{C543DE93-F577-430D-8898-A1B056AC5366}"/>
               </a:ext>
             </a:extLst>
           </p:cNvPr>
@@ -3440,10 +3633,10 @@
         </p:nvSpPr>
         <p:spPr>
           <a:xfrm>
-            <a:off x="7570383" y="1424778"/>
-            <a:ext cx="2083981" cy="1190846"/>
-          </a:xfrm>
-          <a:prstGeom prst="rect">
+            <a:off x="4320364" y="3551560"/>
+            <a:ext cx="3806456" cy="701748"/>
+          </a:xfrm>
+          <a:prstGeom prst="roundRect">
             <a:avLst/>
           </a:prstGeom>
         </p:spPr>
@@ -3470,17 +3663,17 @@
             <a:pPr algn="ctr"/>
             <a:r>
               <a:rPr lang="es-PE" sz="1200" dirty="0"/>
-              <a:t>CLIENTES INSATISFECHOS CON EL SERVICIO DE ATENCION AL CLIENTE</a:t>
-            </a:r>
-          </a:p>
-        </p:txBody>
-      </p:sp>
-      <p:sp>
-        <p:nvSpPr>
-          <p:cNvPr id="7" name="CuadroTexto 6">
-            <a:extLst>
-              <a:ext uri="{FF2B5EF4-FFF2-40B4-BE49-F238E27FC236}">
-                <a16:creationId xmlns:a16="http://schemas.microsoft.com/office/drawing/2014/main" id="{4292C5C3-1932-404D-809B-702C356DA5FB}"/>
+              <a:t>EXCESIVO TIEMPO DE ESPERA QUE SUFREN LOS CLIENTES EN LAS AGENCIAS DEL BCP</a:t>
+            </a:r>
+          </a:p>
+        </p:txBody>
+      </p:sp>
+      <p:sp>
+        <p:nvSpPr>
+          <p:cNvPr id="5" name="CuadroTexto 4">
+            <a:extLst>
+              <a:ext uri="{FF2B5EF4-FFF2-40B4-BE49-F238E27FC236}">
+                <a16:creationId xmlns:a16="http://schemas.microsoft.com/office/drawing/2014/main" id="{B80F88E9-9197-4798-99A8-2CDD14DB5ADE}"/>
               </a:ext>
             </a:extLst>
           </p:cNvPr>
@@ -3489,8 +3682,8 @@
         </p:nvSpPr>
         <p:spPr>
           <a:xfrm>
-            <a:off x="1127048" y="1935413"/>
-            <a:ext cx="632994" cy="276999"/>
+            <a:off x="1127048" y="3668245"/>
+            <a:ext cx="786497" cy="276999"/>
           </a:xfrm>
           <a:prstGeom prst="rect">
             <a:avLst/>
@@ -3505,52 +3698,17 @@
           <a:p>
             <a:r>
               <a:rPr lang="es-PE" sz="1200" dirty="0"/>
-              <a:t>Efectos</a:t>
-            </a:r>
-          </a:p>
-        </p:txBody>
-      </p:sp>
-      <p:sp>
-        <p:nvSpPr>
-          <p:cNvPr id="8" name="CuadroTexto 7">
-            <a:extLst>
-              <a:ext uri="{FF2B5EF4-FFF2-40B4-BE49-F238E27FC236}">
-                <a16:creationId xmlns:a16="http://schemas.microsoft.com/office/drawing/2014/main" id="{DA20895E-8D67-4E3F-A5F6-D26B0E06E453}"/>
-              </a:ext>
-            </a:extLst>
-          </p:cNvPr>
-          <p:cNvSpPr txBox="1"/>
-          <p:nvPr/>
-        </p:nvSpPr>
-        <p:spPr>
-          <a:xfrm>
-            <a:off x="1127048" y="5305380"/>
-            <a:ext cx="615874" cy="276999"/>
-          </a:xfrm>
-          <a:prstGeom prst="rect">
-            <a:avLst/>
-          </a:prstGeom>
-          <a:noFill/>
-        </p:spPr>
-        <p:txBody>
-          <a:bodyPr wrap="none" rtlCol="0">
-            <a:spAutoFit/>
-          </a:bodyPr>
-          <a:lstStyle/>
-          <a:p>
-            <a:r>
-              <a:rPr lang="es-PE" sz="1200" dirty="0"/>
-              <a:t>Causas</a:t>
-            </a:r>
-          </a:p>
-        </p:txBody>
-      </p:sp>
-      <p:sp>
-        <p:nvSpPr>
-          <p:cNvPr id="11" name="Rectángulo 10">
-            <a:extLst>
-              <a:ext uri="{FF2B5EF4-FFF2-40B4-BE49-F238E27FC236}">
-                <a16:creationId xmlns:a16="http://schemas.microsoft.com/office/drawing/2014/main" id="{782DF658-994E-4D3D-9BB3-BD7116A8360B}"/>
+              <a:t>Problema</a:t>
+            </a:r>
+          </a:p>
+        </p:txBody>
+      </p:sp>
+      <p:sp>
+        <p:nvSpPr>
+          <p:cNvPr id="6" name="Rectángulo 5">
+            <a:extLst>
+              <a:ext uri="{FF2B5EF4-FFF2-40B4-BE49-F238E27FC236}">
+                <a16:creationId xmlns:a16="http://schemas.microsoft.com/office/drawing/2014/main" id="{5B8766BE-7CD9-4569-86D0-4F8F9B330582}"/>
               </a:ext>
             </a:extLst>
           </p:cNvPr>
@@ -3559,7 +3717,7 @@
         </p:nvSpPr>
         <p:spPr>
           <a:xfrm>
-            <a:off x="5181601" y="1419600"/>
+            <a:off x="7570383" y="1424778"/>
             <a:ext cx="2083981" cy="1190846"/>
           </a:xfrm>
           <a:prstGeom prst="rect">
@@ -3589,17 +3747,87 @@
             <a:pPr algn="ctr"/>
             <a:r>
               <a:rPr lang="es-PE" sz="1200" dirty="0"/>
-              <a:t>GENERA LARGAS COLAS Y PERDIDA DE TIEMPO</a:t>
-            </a:r>
-          </a:p>
-        </p:txBody>
-      </p:sp>
-      <p:sp>
-        <p:nvSpPr>
-          <p:cNvPr id="12" name="Rectángulo 11">
-            <a:extLst>
-              <a:ext uri="{FF2B5EF4-FFF2-40B4-BE49-F238E27FC236}">
-                <a16:creationId xmlns:a16="http://schemas.microsoft.com/office/drawing/2014/main" id="{101143B3-E9D4-4BD1-993E-F9A432DBB955}"/>
+              <a:t>CLIENTES INSATISFECHOS CON EL SERVICIO DE ATENCION AL CLIENTE</a:t>
+            </a:r>
+          </a:p>
+        </p:txBody>
+      </p:sp>
+      <p:sp>
+        <p:nvSpPr>
+          <p:cNvPr id="7" name="CuadroTexto 6">
+            <a:extLst>
+              <a:ext uri="{FF2B5EF4-FFF2-40B4-BE49-F238E27FC236}">
+                <a16:creationId xmlns:a16="http://schemas.microsoft.com/office/drawing/2014/main" id="{4292C5C3-1932-404D-809B-702C356DA5FB}"/>
+              </a:ext>
+            </a:extLst>
+          </p:cNvPr>
+          <p:cNvSpPr txBox="1"/>
+          <p:nvPr/>
+        </p:nvSpPr>
+        <p:spPr>
+          <a:xfrm>
+            <a:off x="1127048" y="1935413"/>
+            <a:ext cx="632994" cy="276999"/>
+          </a:xfrm>
+          <a:prstGeom prst="rect">
+            <a:avLst/>
+          </a:prstGeom>
+          <a:noFill/>
+        </p:spPr>
+        <p:txBody>
+          <a:bodyPr wrap="none" rtlCol="0">
+            <a:spAutoFit/>
+          </a:bodyPr>
+          <a:lstStyle/>
+          <a:p>
+            <a:r>
+              <a:rPr lang="es-PE" sz="1200" dirty="0"/>
+              <a:t>Efectos</a:t>
+            </a:r>
+          </a:p>
+        </p:txBody>
+      </p:sp>
+      <p:sp>
+        <p:nvSpPr>
+          <p:cNvPr id="8" name="CuadroTexto 7">
+            <a:extLst>
+              <a:ext uri="{FF2B5EF4-FFF2-40B4-BE49-F238E27FC236}">
+                <a16:creationId xmlns:a16="http://schemas.microsoft.com/office/drawing/2014/main" id="{DA20895E-8D67-4E3F-A5F6-D26B0E06E453}"/>
+              </a:ext>
+            </a:extLst>
+          </p:cNvPr>
+          <p:cNvSpPr txBox="1"/>
+          <p:nvPr/>
+        </p:nvSpPr>
+        <p:spPr>
+          <a:xfrm>
+            <a:off x="1127048" y="5305380"/>
+            <a:ext cx="615874" cy="276999"/>
+          </a:xfrm>
+          <a:prstGeom prst="rect">
+            <a:avLst/>
+          </a:prstGeom>
+          <a:noFill/>
+        </p:spPr>
+        <p:txBody>
+          <a:bodyPr wrap="none" rtlCol="0">
+            <a:spAutoFit/>
+          </a:bodyPr>
+          <a:lstStyle/>
+          <a:p>
+            <a:r>
+              <a:rPr lang="es-PE" sz="1200" dirty="0"/>
+              <a:t>Causas</a:t>
+            </a:r>
+          </a:p>
+        </p:txBody>
+      </p:sp>
+      <p:sp>
+        <p:nvSpPr>
+          <p:cNvPr id="11" name="Rectángulo 10">
+            <a:extLst>
+              <a:ext uri="{FF2B5EF4-FFF2-40B4-BE49-F238E27FC236}">
+                <a16:creationId xmlns:a16="http://schemas.microsoft.com/office/drawing/2014/main" id="{782DF658-994E-4D3D-9BB3-BD7116A8360B}"/>
               </a:ext>
             </a:extLst>
           </p:cNvPr>
@@ -3608,7 +3836,7 @@
         </p:nvSpPr>
         <p:spPr>
           <a:xfrm>
-            <a:off x="2792820" y="1419600"/>
+            <a:off x="5181601" y="1419600"/>
             <a:ext cx="2083981" cy="1190846"/>
           </a:xfrm>
           <a:prstGeom prst="rect">
@@ -3638,17 +3866,17 @@
             <a:pPr algn="ctr"/>
             <a:r>
               <a:rPr lang="es-PE" sz="1200" dirty="0"/>
-              <a:t>DESMOTIVACION DEL PERSONAL DE LA AGENCIA</a:t>
-            </a:r>
-          </a:p>
-        </p:txBody>
-      </p:sp>
-      <p:sp>
-        <p:nvSpPr>
-          <p:cNvPr id="13" name="Rectángulo 12">
-            <a:extLst>
-              <a:ext uri="{FF2B5EF4-FFF2-40B4-BE49-F238E27FC236}">
-                <a16:creationId xmlns:a16="http://schemas.microsoft.com/office/drawing/2014/main" id="{9810E548-35C2-47FB-8AB2-3F1B34211164}"/>
+              <a:t>GENERA LARGAS COLAS Y PERDIDA DE TIEMPO</a:t>
+            </a:r>
+          </a:p>
+        </p:txBody>
+      </p:sp>
+      <p:sp>
+        <p:nvSpPr>
+          <p:cNvPr id="12" name="Rectángulo 11">
+            <a:extLst>
+              <a:ext uri="{FF2B5EF4-FFF2-40B4-BE49-F238E27FC236}">
+                <a16:creationId xmlns:a16="http://schemas.microsoft.com/office/drawing/2014/main" id="{101143B3-E9D4-4BD1-993E-F9A432DBB955}"/>
               </a:ext>
             </a:extLst>
           </p:cNvPr>
@@ -3657,7 +3885,7 @@
         </p:nvSpPr>
         <p:spPr>
           <a:xfrm>
-            <a:off x="3763119" y="4837824"/>
+            <a:off x="2792820" y="1419600"/>
             <a:ext cx="2083981" cy="1190846"/>
           </a:xfrm>
           <a:prstGeom prst="rect">
@@ -3687,17 +3915,17 @@
             <a:pPr algn="ctr"/>
             <a:r>
               <a:rPr lang="es-PE" sz="1200" dirty="0"/>
-              <a:t>MALA DISTRIBUCIÓN DE CLIENTES</a:t>
-            </a:r>
-          </a:p>
-        </p:txBody>
-      </p:sp>
-      <p:sp>
-        <p:nvSpPr>
-          <p:cNvPr id="14" name="Rectángulo 13">
-            <a:extLst>
-              <a:ext uri="{FF2B5EF4-FFF2-40B4-BE49-F238E27FC236}">
-                <a16:creationId xmlns:a16="http://schemas.microsoft.com/office/drawing/2014/main" id="{379884D6-8FD4-424D-AC39-A1BE8986BD22}"/>
+              <a:t>DESMOTIVACION DEL PERSONAL DE LA AGENCIA</a:t>
+            </a:r>
+          </a:p>
+        </p:txBody>
+      </p:sp>
+      <p:sp>
+        <p:nvSpPr>
+          <p:cNvPr id="13" name="Rectángulo 12">
+            <a:extLst>
+              <a:ext uri="{FF2B5EF4-FFF2-40B4-BE49-F238E27FC236}">
+                <a16:creationId xmlns:a16="http://schemas.microsoft.com/office/drawing/2014/main" id="{9810E548-35C2-47FB-8AB2-3F1B34211164}"/>
               </a:ext>
             </a:extLst>
           </p:cNvPr>
@@ -3706,7 +3934,7 @@
         </p:nvSpPr>
         <p:spPr>
           <a:xfrm>
-            <a:off x="6600085" y="4837825"/>
+            <a:off x="3763119" y="4837824"/>
             <a:ext cx="2083981" cy="1190846"/>
           </a:xfrm>
           <a:prstGeom prst="rect">
@@ -3736,6 +3964,55 @@
             <a:pPr algn="ctr"/>
             <a:r>
               <a:rPr lang="es-PE" sz="1200" dirty="0"/>
+              <a:t>MALA DISTRIBUCIÓN DE CLIENTES</a:t>
+            </a:r>
+          </a:p>
+        </p:txBody>
+      </p:sp>
+      <p:sp>
+        <p:nvSpPr>
+          <p:cNvPr id="14" name="Rectángulo 13">
+            <a:extLst>
+              <a:ext uri="{FF2B5EF4-FFF2-40B4-BE49-F238E27FC236}">
+                <a16:creationId xmlns:a16="http://schemas.microsoft.com/office/drawing/2014/main" id="{379884D6-8FD4-424D-AC39-A1BE8986BD22}"/>
+              </a:ext>
+            </a:extLst>
+          </p:cNvPr>
+          <p:cNvSpPr/>
+          <p:nvPr/>
+        </p:nvSpPr>
+        <p:spPr>
+          <a:xfrm>
+            <a:off x="6600085" y="4837825"/>
+            <a:ext cx="2083981" cy="1190846"/>
+          </a:xfrm>
+          <a:prstGeom prst="rect">
+            <a:avLst/>
+          </a:prstGeom>
+        </p:spPr>
+        <p:style>
+          <a:lnRef idx="2">
+            <a:schemeClr val="accent1">
+              <a:shade val="50000"/>
+            </a:schemeClr>
+          </a:lnRef>
+          <a:fillRef idx="1">
+            <a:schemeClr val="accent1"/>
+          </a:fillRef>
+          <a:effectRef idx="0">
+            <a:schemeClr val="accent1"/>
+          </a:effectRef>
+          <a:fontRef idx="minor">
+            <a:schemeClr val="lt1"/>
+          </a:fontRef>
+        </p:style>
+        <p:txBody>
+          <a:bodyPr rtlCol="0" anchor="ctr"/>
+          <a:lstStyle/>
+          <a:p>
+            <a:pPr algn="ctr"/>
+            <a:r>
+              <a:rPr lang="es-PE" sz="1200" dirty="0"/>
               <a:t>DESCONOCIMIENTO DEL CLIENTE SOBRE CANALES ALTERNATIVOS</a:t>
             </a:r>
           </a:p>
@@ -3756,7 +4033,7 @@
         <p:spPr>
           <a:xfrm>
             <a:off x="4805109" y="413445"/>
-            <a:ext cx="2854436" cy="369332"/>
+            <a:ext cx="3669851" cy="369332"/>
           </a:xfrm>
           <a:prstGeom prst="rect">
             <a:avLst/>
@@ -3777,7 +4054,7 @@
                   </a:schemeClr>
                 </a:solidFill>
               </a:rPr>
-              <a:t>EL ARBOL CAUSA Y EFECTO</a:t>
+              <a:t>EL ARBOL CAUSA Y EFECTO (antiguo)</a:t>
             </a:r>
             <a:endParaRPr lang="es-PE" dirty="0">
               <a:solidFill>
@@ -3988,6 +4265,678 @@
     <p:extLst>
       <p:ext uri="{BB962C8B-B14F-4D97-AF65-F5344CB8AC3E}">
         <p14:creationId xmlns:p14="http://schemas.microsoft.com/office/powerpoint/2010/main" val="3960497121"/>
+      </p:ext>
+    </p:extLst>
+  </p:cSld>
+  <p:clrMapOvr>
+    <a:masterClrMapping/>
+  </p:clrMapOvr>
+</p:sld>
+</file>
+
+<file path=ppt/slides/slide3.xml><?xml version="1.0" encoding="utf-8"?>
+<p:sld xmlns:a="http://schemas.openxmlformats.org/drawingml/2006/main" xmlns:r="http://schemas.openxmlformats.org/officeDocument/2006/relationships" xmlns:p="http://schemas.openxmlformats.org/presentationml/2006/main">
+  <p:cSld>
+    <p:spTree>
+      <p:nvGrpSpPr>
+        <p:cNvPr id="1" name=""/>
+        <p:cNvGrpSpPr/>
+        <p:nvPr/>
+      </p:nvGrpSpPr>
+      <p:grpSpPr>
+        <a:xfrm>
+          <a:off x="0" y="0"/>
+          <a:ext cx="0" cy="0"/>
+          <a:chOff x="0" y="0"/>
+          <a:chExt cx="0" cy="0"/>
+        </a:xfrm>
+      </p:grpSpPr>
+      <p:sp>
+        <p:nvSpPr>
+          <p:cNvPr id="4" name="Rectángulo: esquinas redondeadas 3">
+            <a:extLst>
+              <a:ext uri="{FF2B5EF4-FFF2-40B4-BE49-F238E27FC236}">
+                <a16:creationId xmlns:a16="http://schemas.microsoft.com/office/drawing/2014/main" id="{C543DE93-F577-430D-8898-A1B056AC5366}"/>
+              </a:ext>
+            </a:extLst>
+          </p:cNvPr>
+          <p:cNvSpPr/>
+          <p:nvPr/>
+        </p:nvSpPr>
+        <p:spPr>
+          <a:xfrm>
+            <a:off x="4320364" y="3551560"/>
+            <a:ext cx="3806456" cy="701748"/>
+          </a:xfrm>
+          <a:prstGeom prst="roundRect">
+            <a:avLst/>
+          </a:prstGeom>
+        </p:spPr>
+        <p:style>
+          <a:lnRef idx="2">
+            <a:schemeClr val="accent1">
+              <a:shade val="50000"/>
+            </a:schemeClr>
+          </a:lnRef>
+          <a:fillRef idx="1">
+            <a:schemeClr val="accent1"/>
+          </a:fillRef>
+          <a:effectRef idx="0">
+            <a:schemeClr val="accent1"/>
+          </a:effectRef>
+          <a:fontRef idx="minor">
+            <a:schemeClr val="lt1"/>
+          </a:fontRef>
+        </p:style>
+        <p:txBody>
+          <a:bodyPr rtlCol="0" anchor="ctr"/>
+          <a:lstStyle/>
+          <a:p>
+            <a:pPr algn="ctr"/>
+            <a:r>
+              <a:rPr lang="es-PE" sz="1200" dirty="0"/>
+              <a:t>La mala distribución del cliente para llegar a la agencias mas optima</a:t>
+            </a:r>
+          </a:p>
+        </p:txBody>
+      </p:sp>
+      <p:sp>
+        <p:nvSpPr>
+          <p:cNvPr id="5" name="CuadroTexto 4">
+            <a:extLst>
+              <a:ext uri="{FF2B5EF4-FFF2-40B4-BE49-F238E27FC236}">
+                <a16:creationId xmlns:a16="http://schemas.microsoft.com/office/drawing/2014/main" id="{B80F88E9-9197-4798-99A8-2CDD14DB5ADE}"/>
+              </a:ext>
+            </a:extLst>
+          </p:cNvPr>
+          <p:cNvSpPr txBox="1"/>
+          <p:nvPr/>
+        </p:nvSpPr>
+        <p:spPr>
+          <a:xfrm>
+            <a:off x="1127048" y="3668245"/>
+            <a:ext cx="786497" cy="276999"/>
+          </a:xfrm>
+          <a:prstGeom prst="rect">
+            <a:avLst/>
+          </a:prstGeom>
+          <a:noFill/>
+        </p:spPr>
+        <p:txBody>
+          <a:bodyPr wrap="none" rtlCol="0">
+            <a:spAutoFit/>
+          </a:bodyPr>
+          <a:lstStyle/>
+          <a:p>
+            <a:r>
+              <a:rPr lang="es-PE" sz="1200" dirty="0"/>
+              <a:t>Problema</a:t>
+            </a:r>
+          </a:p>
+        </p:txBody>
+      </p:sp>
+      <p:sp>
+        <p:nvSpPr>
+          <p:cNvPr id="6" name="Rectángulo 5">
+            <a:extLst>
+              <a:ext uri="{FF2B5EF4-FFF2-40B4-BE49-F238E27FC236}">
+                <a16:creationId xmlns:a16="http://schemas.microsoft.com/office/drawing/2014/main" id="{5B8766BE-7CD9-4569-86D0-4F8F9B330582}"/>
+              </a:ext>
+            </a:extLst>
+          </p:cNvPr>
+          <p:cNvSpPr/>
+          <p:nvPr/>
+        </p:nvSpPr>
+        <p:spPr>
+          <a:xfrm>
+            <a:off x="7570383" y="1424778"/>
+            <a:ext cx="2083981" cy="1190846"/>
+          </a:xfrm>
+          <a:prstGeom prst="rect">
+            <a:avLst/>
+          </a:prstGeom>
+        </p:spPr>
+        <p:style>
+          <a:lnRef idx="2">
+            <a:schemeClr val="accent1">
+              <a:shade val="50000"/>
+            </a:schemeClr>
+          </a:lnRef>
+          <a:fillRef idx="1">
+            <a:schemeClr val="accent1"/>
+          </a:fillRef>
+          <a:effectRef idx="0">
+            <a:schemeClr val="accent1"/>
+          </a:effectRef>
+          <a:fontRef idx="minor">
+            <a:schemeClr val="lt1"/>
+          </a:fontRef>
+        </p:style>
+        <p:txBody>
+          <a:bodyPr rtlCol="0" anchor="ctr"/>
+          <a:lstStyle/>
+          <a:p>
+            <a:pPr algn="ctr"/>
+            <a:r>
+              <a:rPr lang="es-PE" sz="1200" dirty="0"/>
+              <a:t>MAYOR TRABAJO PARA ALGUNAS AGENCIAS</a:t>
+            </a:r>
+          </a:p>
+        </p:txBody>
+      </p:sp>
+      <p:sp>
+        <p:nvSpPr>
+          <p:cNvPr id="7" name="CuadroTexto 6">
+            <a:extLst>
+              <a:ext uri="{FF2B5EF4-FFF2-40B4-BE49-F238E27FC236}">
+                <a16:creationId xmlns:a16="http://schemas.microsoft.com/office/drawing/2014/main" id="{4292C5C3-1932-404D-809B-702C356DA5FB}"/>
+              </a:ext>
+            </a:extLst>
+          </p:cNvPr>
+          <p:cNvSpPr txBox="1"/>
+          <p:nvPr/>
+        </p:nvSpPr>
+        <p:spPr>
+          <a:xfrm>
+            <a:off x="1127048" y="1935413"/>
+            <a:ext cx="632994" cy="276999"/>
+          </a:xfrm>
+          <a:prstGeom prst="rect">
+            <a:avLst/>
+          </a:prstGeom>
+          <a:noFill/>
+        </p:spPr>
+        <p:txBody>
+          <a:bodyPr wrap="none" rtlCol="0">
+            <a:spAutoFit/>
+          </a:bodyPr>
+          <a:lstStyle/>
+          <a:p>
+            <a:r>
+              <a:rPr lang="es-PE" sz="1200" dirty="0"/>
+              <a:t>Efectos</a:t>
+            </a:r>
+          </a:p>
+        </p:txBody>
+      </p:sp>
+      <p:sp>
+        <p:nvSpPr>
+          <p:cNvPr id="8" name="CuadroTexto 7">
+            <a:extLst>
+              <a:ext uri="{FF2B5EF4-FFF2-40B4-BE49-F238E27FC236}">
+                <a16:creationId xmlns:a16="http://schemas.microsoft.com/office/drawing/2014/main" id="{DA20895E-8D67-4E3F-A5F6-D26B0E06E453}"/>
+              </a:ext>
+            </a:extLst>
+          </p:cNvPr>
+          <p:cNvSpPr txBox="1"/>
+          <p:nvPr/>
+        </p:nvSpPr>
+        <p:spPr>
+          <a:xfrm>
+            <a:off x="1127048" y="5305380"/>
+            <a:ext cx="615874" cy="276999"/>
+          </a:xfrm>
+          <a:prstGeom prst="rect">
+            <a:avLst/>
+          </a:prstGeom>
+          <a:noFill/>
+        </p:spPr>
+        <p:txBody>
+          <a:bodyPr wrap="none" rtlCol="0">
+            <a:spAutoFit/>
+          </a:bodyPr>
+          <a:lstStyle/>
+          <a:p>
+            <a:r>
+              <a:rPr lang="es-PE" sz="1200" dirty="0"/>
+              <a:t>Causas</a:t>
+            </a:r>
+          </a:p>
+        </p:txBody>
+      </p:sp>
+      <p:sp>
+        <p:nvSpPr>
+          <p:cNvPr id="11" name="Rectángulo 10">
+            <a:extLst>
+              <a:ext uri="{FF2B5EF4-FFF2-40B4-BE49-F238E27FC236}">
+                <a16:creationId xmlns:a16="http://schemas.microsoft.com/office/drawing/2014/main" id="{782DF658-994E-4D3D-9BB3-BD7116A8360B}"/>
+              </a:ext>
+            </a:extLst>
+          </p:cNvPr>
+          <p:cNvSpPr/>
+          <p:nvPr/>
+        </p:nvSpPr>
+        <p:spPr>
+          <a:xfrm>
+            <a:off x="5181601" y="1419600"/>
+            <a:ext cx="2083981" cy="1190846"/>
+          </a:xfrm>
+          <a:prstGeom prst="rect">
+            <a:avLst/>
+          </a:prstGeom>
+        </p:spPr>
+        <p:style>
+          <a:lnRef idx="2">
+            <a:schemeClr val="accent1">
+              <a:shade val="50000"/>
+            </a:schemeClr>
+          </a:lnRef>
+          <a:fillRef idx="1">
+            <a:schemeClr val="accent1"/>
+          </a:fillRef>
+          <a:effectRef idx="0">
+            <a:schemeClr val="accent1"/>
+          </a:effectRef>
+          <a:fontRef idx="minor">
+            <a:schemeClr val="lt1"/>
+          </a:fontRef>
+        </p:style>
+        <p:txBody>
+          <a:bodyPr rtlCol="0" anchor="ctr"/>
+          <a:lstStyle/>
+          <a:p>
+            <a:pPr algn="ctr"/>
+            <a:r>
+              <a:rPr lang="es-PE" sz="1200" dirty="0"/>
+              <a:t>GENERA LARGAS COLAS Y PERDIDA DE TIEMPO</a:t>
+            </a:r>
+          </a:p>
+        </p:txBody>
+      </p:sp>
+      <p:sp>
+        <p:nvSpPr>
+          <p:cNvPr id="12" name="Rectángulo 11">
+            <a:extLst>
+              <a:ext uri="{FF2B5EF4-FFF2-40B4-BE49-F238E27FC236}">
+                <a16:creationId xmlns:a16="http://schemas.microsoft.com/office/drawing/2014/main" id="{101143B3-E9D4-4BD1-993E-F9A432DBB955}"/>
+              </a:ext>
+            </a:extLst>
+          </p:cNvPr>
+          <p:cNvSpPr/>
+          <p:nvPr/>
+        </p:nvSpPr>
+        <p:spPr>
+          <a:xfrm>
+            <a:off x="2792820" y="1419600"/>
+            <a:ext cx="2083981" cy="1190846"/>
+          </a:xfrm>
+          <a:prstGeom prst="rect">
+            <a:avLst/>
+          </a:prstGeom>
+        </p:spPr>
+        <p:style>
+          <a:lnRef idx="2">
+            <a:schemeClr val="accent1">
+              <a:shade val="50000"/>
+            </a:schemeClr>
+          </a:lnRef>
+          <a:fillRef idx="1">
+            <a:schemeClr val="accent1"/>
+          </a:fillRef>
+          <a:effectRef idx="0">
+            <a:schemeClr val="accent1"/>
+          </a:effectRef>
+          <a:fontRef idx="minor">
+            <a:schemeClr val="lt1"/>
+          </a:fontRef>
+        </p:style>
+        <p:txBody>
+          <a:bodyPr rtlCol="0" anchor="ctr"/>
+          <a:lstStyle/>
+          <a:p>
+            <a:pPr algn="ctr"/>
+            <a:r>
+              <a:rPr lang="es-PE" sz="1200" dirty="0"/>
+              <a:t>ENCONTRAR UNA AGENCIA LLENA</a:t>
+            </a:r>
+          </a:p>
+        </p:txBody>
+      </p:sp>
+      <p:sp>
+        <p:nvSpPr>
+          <p:cNvPr id="13" name="Rectángulo 12">
+            <a:extLst>
+              <a:ext uri="{FF2B5EF4-FFF2-40B4-BE49-F238E27FC236}">
+                <a16:creationId xmlns:a16="http://schemas.microsoft.com/office/drawing/2014/main" id="{9810E548-35C2-47FB-8AB2-3F1B34211164}"/>
+              </a:ext>
+            </a:extLst>
+          </p:cNvPr>
+          <p:cNvSpPr/>
+          <p:nvPr/>
+        </p:nvSpPr>
+        <p:spPr>
+          <a:xfrm>
+            <a:off x="3763119" y="4837824"/>
+            <a:ext cx="2083981" cy="1190846"/>
+          </a:xfrm>
+          <a:prstGeom prst="rect">
+            <a:avLst/>
+          </a:prstGeom>
+        </p:spPr>
+        <p:style>
+          <a:lnRef idx="2">
+            <a:schemeClr val="accent1">
+              <a:shade val="50000"/>
+            </a:schemeClr>
+          </a:lnRef>
+          <a:fillRef idx="1">
+            <a:schemeClr val="accent1"/>
+          </a:fillRef>
+          <a:effectRef idx="0">
+            <a:schemeClr val="accent1"/>
+          </a:effectRef>
+          <a:fontRef idx="minor">
+            <a:schemeClr val="lt1"/>
+          </a:fontRef>
+        </p:style>
+        <p:txBody>
+          <a:bodyPr rtlCol="0" anchor="ctr"/>
+          <a:lstStyle/>
+          <a:p>
+            <a:pPr algn="ctr"/>
+            <a:r>
+              <a:rPr lang="es-PE" sz="1200" dirty="0"/>
+              <a:t>DESACTUALIZACION DEL APLICATIVO BANCA MOVIL</a:t>
+            </a:r>
+          </a:p>
+        </p:txBody>
+      </p:sp>
+      <p:sp>
+        <p:nvSpPr>
+          <p:cNvPr id="14" name="Rectángulo 13">
+            <a:extLst>
+              <a:ext uri="{FF2B5EF4-FFF2-40B4-BE49-F238E27FC236}">
+                <a16:creationId xmlns:a16="http://schemas.microsoft.com/office/drawing/2014/main" id="{379884D6-8FD4-424D-AC39-A1BE8986BD22}"/>
+              </a:ext>
+            </a:extLst>
+          </p:cNvPr>
+          <p:cNvSpPr/>
+          <p:nvPr/>
+        </p:nvSpPr>
+        <p:spPr>
+          <a:xfrm>
+            <a:off x="6600085" y="4837825"/>
+            <a:ext cx="2083981" cy="1190846"/>
+          </a:xfrm>
+          <a:prstGeom prst="rect">
+            <a:avLst/>
+          </a:prstGeom>
+        </p:spPr>
+        <p:style>
+          <a:lnRef idx="2">
+            <a:schemeClr val="accent1">
+              <a:shade val="50000"/>
+            </a:schemeClr>
+          </a:lnRef>
+          <a:fillRef idx="1">
+            <a:schemeClr val="accent1"/>
+          </a:fillRef>
+          <a:effectRef idx="0">
+            <a:schemeClr val="accent1"/>
+          </a:effectRef>
+          <a:fontRef idx="minor">
+            <a:schemeClr val="lt1"/>
+          </a:fontRef>
+        </p:style>
+        <p:txBody>
+          <a:bodyPr rtlCol="0" anchor="ctr"/>
+          <a:lstStyle/>
+          <a:p>
+            <a:pPr algn="ctr"/>
+            <a:r>
+              <a:rPr lang="es-PE" sz="1200" dirty="0"/>
+              <a:t>DESCONOCIMIENTO DEL CLIENTE SOBRE CANALES ALTERNATIVOS</a:t>
+            </a:r>
+          </a:p>
+        </p:txBody>
+      </p:sp>
+      <p:sp>
+        <p:nvSpPr>
+          <p:cNvPr id="15" name="CuadroTexto 14">
+            <a:extLst>
+              <a:ext uri="{FF2B5EF4-FFF2-40B4-BE49-F238E27FC236}">
+                <a16:creationId xmlns:a16="http://schemas.microsoft.com/office/drawing/2014/main" id="{9E0C98CE-417C-47E0-BF22-65A048742093}"/>
+              </a:ext>
+            </a:extLst>
+          </p:cNvPr>
+          <p:cNvSpPr txBox="1"/>
+          <p:nvPr/>
+        </p:nvSpPr>
+        <p:spPr>
+          <a:xfrm>
+            <a:off x="4805109" y="413445"/>
+            <a:ext cx="3534044" cy="369332"/>
+          </a:xfrm>
+          <a:prstGeom prst="rect">
+            <a:avLst/>
+          </a:prstGeom>
+          <a:noFill/>
+        </p:spPr>
+        <p:txBody>
+          <a:bodyPr wrap="none" rtlCol="0">
+            <a:spAutoFit/>
+          </a:bodyPr>
+          <a:lstStyle/>
+          <a:p>
+            <a:r>
+              <a:rPr lang="es-PE" b="1" dirty="0">
+                <a:solidFill>
+                  <a:schemeClr val="accent1">
+                    <a:lumMod val="75000"/>
+                  </a:schemeClr>
+                </a:solidFill>
+              </a:rPr>
+              <a:t>EL ARBOL CAUSA Y EFECTO (nuevo)</a:t>
+            </a:r>
+            <a:endParaRPr lang="es-PE" dirty="0">
+              <a:solidFill>
+                <a:schemeClr val="accent1">
+                  <a:lumMod val="75000"/>
+                </a:schemeClr>
+              </a:solidFill>
+            </a:endParaRPr>
+          </a:p>
+        </p:txBody>
+      </p:sp>
+      <p:cxnSp>
+        <p:nvCxnSpPr>
+          <p:cNvPr id="17" name="Conector recto 16">
+            <a:extLst>
+              <a:ext uri="{FF2B5EF4-FFF2-40B4-BE49-F238E27FC236}">
+                <a16:creationId xmlns:a16="http://schemas.microsoft.com/office/drawing/2014/main" id="{7FBA7DBB-1977-464C-9E82-168D203A54BD}"/>
+              </a:ext>
+            </a:extLst>
+          </p:cNvPr>
+          <p:cNvCxnSpPr>
+            <a:stCxn id="12" idx="2"/>
+            <a:endCxn id="4" idx="0"/>
+          </p:cNvCxnSpPr>
+          <p:nvPr/>
+        </p:nvCxnSpPr>
+        <p:spPr>
+          <a:xfrm>
+            <a:off x="3834811" y="2610446"/>
+            <a:ext cx="2388781" cy="941114"/>
+          </a:xfrm>
+          <a:prstGeom prst="line">
+            <a:avLst/>
+          </a:prstGeom>
+        </p:spPr>
+        <p:style>
+          <a:lnRef idx="1">
+            <a:schemeClr val="accent1"/>
+          </a:lnRef>
+          <a:fillRef idx="0">
+            <a:schemeClr val="accent1"/>
+          </a:fillRef>
+          <a:effectRef idx="0">
+            <a:schemeClr val="accent1"/>
+          </a:effectRef>
+          <a:fontRef idx="minor">
+            <a:schemeClr val="tx1"/>
+          </a:fontRef>
+        </p:style>
+      </p:cxnSp>
+      <p:cxnSp>
+        <p:nvCxnSpPr>
+          <p:cNvPr id="19" name="Conector recto 18">
+            <a:extLst>
+              <a:ext uri="{FF2B5EF4-FFF2-40B4-BE49-F238E27FC236}">
+                <a16:creationId xmlns:a16="http://schemas.microsoft.com/office/drawing/2014/main" id="{0530D635-2ECF-4016-9BB1-555CAD1E60AC}"/>
+              </a:ext>
+            </a:extLst>
+          </p:cNvPr>
+          <p:cNvCxnSpPr>
+            <a:stCxn id="11" idx="2"/>
+            <a:endCxn id="4" idx="0"/>
+          </p:cNvCxnSpPr>
+          <p:nvPr/>
+        </p:nvCxnSpPr>
+        <p:spPr>
+          <a:xfrm>
+            <a:off x="6223592" y="2610446"/>
+            <a:ext cx="0" cy="941114"/>
+          </a:xfrm>
+          <a:prstGeom prst="line">
+            <a:avLst/>
+          </a:prstGeom>
+        </p:spPr>
+        <p:style>
+          <a:lnRef idx="1">
+            <a:schemeClr val="accent1"/>
+          </a:lnRef>
+          <a:fillRef idx="0">
+            <a:schemeClr val="accent1"/>
+          </a:fillRef>
+          <a:effectRef idx="0">
+            <a:schemeClr val="accent1"/>
+          </a:effectRef>
+          <a:fontRef idx="minor">
+            <a:schemeClr val="tx1"/>
+          </a:fontRef>
+        </p:style>
+      </p:cxnSp>
+      <p:cxnSp>
+        <p:nvCxnSpPr>
+          <p:cNvPr id="21" name="Conector recto 20">
+            <a:extLst>
+              <a:ext uri="{FF2B5EF4-FFF2-40B4-BE49-F238E27FC236}">
+                <a16:creationId xmlns:a16="http://schemas.microsoft.com/office/drawing/2014/main" id="{5442AB1F-FD8B-43AB-A844-FF6E8E4574FD}"/>
+              </a:ext>
+            </a:extLst>
+          </p:cNvPr>
+          <p:cNvCxnSpPr>
+            <a:stCxn id="6" idx="2"/>
+            <a:endCxn id="4" idx="0"/>
+          </p:cNvCxnSpPr>
+          <p:nvPr/>
+        </p:nvCxnSpPr>
+        <p:spPr>
+          <a:xfrm flipH="1">
+            <a:off x="6223592" y="2615624"/>
+            <a:ext cx="2388782" cy="935936"/>
+          </a:xfrm>
+          <a:prstGeom prst="line">
+            <a:avLst/>
+          </a:prstGeom>
+        </p:spPr>
+        <p:style>
+          <a:lnRef idx="1">
+            <a:schemeClr val="accent1"/>
+          </a:lnRef>
+          <a:fillRef idx="0">
+            <a:schemeClr val="accent1"/>
+          </a:fillRef>
+          <a:effectRef idx="0">
+            <a:schemeClr val="accent1"/>
+          </a:effectRef>
+          <a:fontRef idx="minor">
+            <a:schemeClr val="tx1"/>
+          </a:fontRef>
+        </p:style>
+      </p:cxnSp>
+      <p:cxnSp>
+        <p:nvCxnSpPr>
+          <p:cNvPr id="23" name="Conector recto 22">
+            <a:extLst>
+              <a:ext uri="{FF2B5EF4-FFF2-40B4-BE49-F238E27FC236}">
+                <a16:creationId xmlns:a16="http://schemas.microsoft.com/office/drawing/2014/main" id="{85B5A291-D75C-4ADF-A2DC-37FE75096211}"/>
+              </a:ext>
+            </a:extLst>
+          </p:cNvPr>
+          <p:cNvCxnSpPr>
+            <a:stCxn id="4" idx="2"/>
+            <a:endCxn id="13" idx="0"/>
+          </p:cNvCxnSpPr>
+          <p:nvPr/>
+        </p:nvCxnSpPr>
+        <p:spPr>
+          <a:xfrm flipH="1">
+            <a:off x="4805110" y="4253308"/>
+            <a:ext cx="1418482" cy="584516"/>
+          </a:xfrm>
+          <a:prstGeom prst="line">
+            <a:avLst/>
+          </a:prstGeom>
+        </p:spPr>
+        <p:style>
+          <a:lnRef idx="1">
+            <a:schemeClr val="accent1"/>
+          </a:lnRef>
+          <a:fillRef idx="0">
+            <a:schemeClr val="accent1"/>
+          </a:fillRef>
+          <a:effectRef idx="0">
+            <a:schemeClr val="accent1"/>
+          </a:effectRef>
+          <a:fontRef idx="minor">
+            <a:schemeClr val="tx1"/>
+          </a:fontRef>
+        </p:style>
+      </p:cxnSp>
+      <p:cxnSp>
+        <p:nvCxnSpPr>
+          <p:cNvPr id="25" name="Conector recto 24">
+            <a:extLst>
+              <a:ext uri="{FF2B5EF4-FFF2-40B4-BE49-F238E27FC236}">
+                <a16:creationId xmlns:a16="http://schemas.microsoft.com/office/drawing/2014/main" id="{BF51C1CD-732A-4869-A802-97CD98803550}"/>
+              </a:ext>
+            </a:extLst>
+          </p:cNvPr>
+          <p:cNvCxnSpPr>
+            <a:stCxn id="4" idx="2"/>
+            <a:endCxn id="14" idx="0"/>
+          </p:cNvCxnSpPr>
+          <p:nvPr/>
+        </p:nvCxnSpPr>
+        <p:spPr>
+          <a:xfrm>
+            <a:off x="6223592" y="4253308"/>
+            <a:ext cx="1418484" cy="584517"/>
+          </a:xfrm>
+          <a:prstGeom prst="line">
+            <a:avLst/>
+          </a:prstGeom>
+        </p:spPr>
+        <p:style>
+          <a:lnRef idx="1">
+            <a:schemeClr val="accent1"/>
+          </a:lnRef>
+          <a:fillRef idx="0">
+            <a:schemeClr val="accent1"/>
+          </a:fillRef>
+          <a:effectRef idx="0">
+            <a:schemeClr val="accent1"/>
+          </a:effectRef>
+          <a:fontRef idx="minor">
+            <a:schemeClr val="tx1"/>
+          </a:fontRef>
+        </p:style>
+      </p:cxnSp>
+    </p:spTree>
+    <p:extLst>
+      <p:ext uri="{BB962C8B-B14F-4D97-AF65-F5344CB8AC3E}">
+        <p14:creationId xmlns:p14="http://schemas.microsoft.com/office/powerpoint/2010/main" val="3023222918"/>
       </p:ext>
     </p:extLst>
   </p:cSld>

</xml_diff>